<commit_message>
SSDD proyecto final, AE paper
</commit_message>
<xml_diff>
--- a/CUARTO/TFG/PresentacionSeguimiento_TFG.pptx
+++ b/CUARTO/TFG/PresentacionSeguimiento_TFG.pptx
@@ -24,7 +24,7 @@
     <p:sldId id="365" r:id="rId15"/>
     <p:sldId id="371" r:id="rId16"/>
     <p:sldId id="374" r:id="rId17"/>
-    <p:sldId id="366" r:id="rId18"/>
+    <p:sldId id="375" r:id="rId18"/>
   </p:sldIdLst>
   <p:sldSz cx="9144000" cy="6858000" type="screen4x3"/>
   <p:notesSz cx="7099300" cy="10234613"/>
@@ -2382,7 +2382,7 @@
               <a:pPr>
                 <a:defRPr/>
               </a:pPr>
-              <a:t>02/04/2022</a:t>
+              <a:t>06/04/2022</a:t>
             </a:fld>
             <a:endParaRPr lang="es-ES"/>
           </a:p>
@@ -5774,8 +5774,8 @@
         </p:nvSpPr>
         <p:spPr>
           <a:xfrm>
-            <a:off x="808443" y="1340768"/>
-            <a:ext cx="7527113" cy="3046988"/>
+            <a:off x="808443" y="1882482"/>
+            <a:ext cx="7527113" cy="3785652"/>
           </a:xfrm>
           <a:prstGeom prst="rect">
             <a:avLst/>
@@ -5787,6 +5787,30 @@
             <a:spAutoFit/>
           </a:bodyPr>
           <a:lstStyle/>
+          <a:p>
+            <a:pPr marL="285750" indent="-285750">
+              <a:buFont typeface="Wingdings" panose="05000000000000000000" pitchFamily="2" charset="2"/>
+              <a:buChar char="§"/>
+            </a:pPr>
+            <a:r>
+              <a:rPr lang="es-ES" sz="2400" dirty="0">
+                <a:latin typeface="Trebuchet MS" panose="020B0603020202020204" pitchFamily="34" charset="0"/>
+              </a:rPr>
+              <a:t>Modelo de negocio</a:t>
+            </a:r>
+          </a:p>
+          <a:p>
+            <a:pPr marL="285750" indent="-285750">
+              <a:buFont typeface="Wingdings" panose="05000000000000000000" pitchFamily="2" charset="2"/>
+              <a:buChar char="§"/>
+            </a:pPr>
+            <a:endParaRPr lang="es-ES" sz="2400" dirty="0">
+              <a:solidFill>
+                <a:srgbClr val="FFC000"/>
+              </a:solidFill>
+              <a:latin typeface="Trebuchet MS" panose="020B0603020202020204" pitchFamily="34" charset="0"/>
+            </a:endParaRPr>
+          </a:p>
           <a:p>
             <a:pPr marL="285750" indent="-285750">
               <a:buFont typeface="Wingdings" panose="05000000000000000000" pitchFamily="2" charset="2"/>
@@ -6043,7 +6067,7 @@
         <p:spPr>
           <a:xfrm>
             <a:off x="808443" y="1628800"/>
-            <a:ext cx="7527113" cy="1938992"/>
+            <a:ext cx="7527113" cy="2677656"/>
           </a:xfrm>
           <a:prstGeom prst="rect">
             <a:avLst/>
@@ -6081,12 +6105,30 @@
               <a:buFont typeface="Wingdings" panose="05000000000000000000" pitchFamily="2" charset="2"/>
               <a:buChar char="§"/>
             </a:pPr>
+            <a:endParaRPr lang="es-ES" sz="2400" dirty="0">
+              <a:latin typeface="Trebuchet MS" panose="020B0603020202020204" pitchFamily="34" charset="0"/>
+            </a:endParaRPr>
+          </a:p>
+          <a:p>
+            <a:pPr marL="285750" indent="-285750">
+              <a:buFont typeface="Wingdings" panose="05000000000000000000" pitchFamily="2" charset="2"/>
+              <a:buChar char="§"/>
+            </a:pPr>
             <a:r>
               <a:rPr lang="es-ES" sz="2400" dirty="0">
                 <a:latin typeface="Trebuchet MS" panose="020B0603020202020204" pitchFamily="34" charset="0"/>
               </a:rPr>
               <a:t>Funcionalidad avanzada</a:t>
             </a:r>
+          </a:p>
+          <a:p>
+            <a:pPr marL="285750" indent="-285750">
+              <a:buFont typeface="Wingdings" panose="05000000000000000000" pitchFamily="2" charset="2"/>
+              <a:buChar char="§"/>
+            </a:pPr>
+            <a:endParaRPr lang="es-ES" sz="2400" dirty="0">
+              <a:latin typeface="Trebuchet MS" panose="020B0603020202020204" pitchFamily="34" charset="0"/>
+            </a:endParaRPr>
           </a:p>
           <a:p>
             <a:pPr marL="285750" indent="-285750">
@@ -6158,10 +6200,9 @@
           <a:lstStyle/>
           <a:p>
             <a:r>
-              <a:rPr lang="es-ES_tradnl" altLang="es-ES" dirty="0"/>
+              <a:rPr lang="es-ES" altLang="es-ES" dirty="0"/>
               <a:t>5</a:t>
             </a:r>
-            <a:endParaRPr lang="es-ES" altLang="es-ES" dirty="0"/>
           </a:p>
         </p:txBody>
       </p:sp>
@@ -6182,7 +6223,7 @@
           <a:p>
             <a:r>
               <a:rPr lang="es-ES" altLang="es-ES" dirty="0"/>
-              <a:t>Plan de futuro</a:t>
+              <a:t>Preguntas</a:t>
             </a:r>
           </a:p>
         </p:txBody>
@@ -6190,7 +6231,7 @@
     </p:spTree>
     <p:extLst>
       <p:ext uri="{BB962C8B-B14F-4D97-AF65-F5344CB8AC3E}">
-        <p14:creationId xmlns:p14="http://schemas.microsoft.com/office/powerpoint/2010/main" val="1762256568"/>
+        <p14:creationId xmlns:p14="http://schemas.microsoft.com/office/powerpoint/2010/main" val="4197018888"/>
       </p:ext>
     </p:extLst>
   </p:cSld>
@@ -6250,7 +6291,12 @@
             <p:ph idx="1"/>
           </p:nvPr>
         </p:nvSpPr>
-        <p:spPr/>
+        <p:spPr>
+          <a:xfrm>
+            <a:off x="933319" y="1596771"/>
+            <a:ext cx="7912188" cy="3893077"/>
+          </a:xfrm>
+        </p:spPr>
         <p:txBody>
           <a:bodyPr/>
           <a:lstStyle/>
@@ -6292,16 +6338,6 @@
             <a:r>
               <a:rPr lang="es-ES_tradnl" altLang="es-ES" dirty="0"/>
               <a:t>Situación actual</a:t>
-            </a:r>
-          </a:p>
-          <a:p>
-            <a:pPr marL="457200" indent="-457200">
-              <a:buFont typeface="Optima" panose="02000503060000020004" pitchFamily="2" charset="0"/>
-              <a:buAutoNum type="arabicPeriod"/>
-            </a:pPr>
-            <a:r>
-              <a:rPr lang="es-ES_tradnl" altLang="es-ES" dirty="0"/>
-              <a:t>Plan de futuro</a:t>
             </a:r>
           </a:p>
           <a:p>
@@ -6892,8 +6928,8 @@
         </p:nvSpPr>
         <p:spPr>
           <a:xfrm>
-            <a:off x="340391" y="1105665"/>
-            <a:ext cx="8208912" cy="6124754"/>
+            <a:off x="1547664" y="1268760"/>
+            <a:ext cx="8208912" cy="7386638"/>
           </a:xfrm>
           <a:prstGeom prst="rect">
             <a:avLst/>
@@ -6906,52 +6942,99 @@
           </a:bodyPr>
           <a:lstStyle/>
           <a:p>
-            <a:r>
-              <a:rPr lang="es-ES" sz="2800" b="1" dirty="0">
+            <a:endParaRPr lang="es-ES" sz="2800" b="1" dirty="0">
+              <a:latin typeface="Trebuchet MS" panose="020B0603020202020204" pitchFamily="34" charset="0"/>
+            </a:endParaRPr>
+          </a:p>
+          <a:p>
+            <a:r>
+              <a:rPr lang="es-ES" sz="3600" b="1" dirty="0">
+                <a:solidFill>
+                  <a:srgbClr val="FFC000"/>
+                </a:solidFill>
                 <a:latin typeface="Trebuchet MS" panose="020B0603020202020204" pitchFamily="34" charset="0"/>
               </a:rPr>
-              <a:t>+ 50% </a:t>
-            </a:r>
-          </a:p>
-          <a:p>
-            <a:r>
-              <a:rPr lang="es-ES" sz="2800" b="1" dirty="0">
+              <a:t>+ 64% </a:t>
+            </a:r>
+          </a:p>
+          <a:p>
+            <a:r>
+              <a:rPr lang="es-ES" sz="2000" b="1" dirty="0">
+                <a:solidFill>
+                  <a:schemeClr val="bg2">
+                    <a:lumMod val="75000"/>
+                  </a:schemeClr>
+                </a:solidFill>
                 <a:latin typeface="Trebuchet MS" panose="020B0603020202020204" pitchFamily="34" charset="0"/>
               </a:rPr>
-              <a:t>2021</a:t>
-            </a:r>
+              <a:t> online tras pandemia</a:t>
+            </a:r>
+          </a:p>
+          <a:p>
             <a:endParaRPr lang="es-ES" sz="2800" b="1" dirty="0">
+              <a:latin typeface="Trebuchet MS" panose="020B0603020202020204" pitchFamily="34" charset="0"/>
+            </a:endParaRPr>
+          </a:p>
+          <a:p>
+            <a:r>
+              <a:rPr lang="es-ES" sz="3600" b="1" dirty="0">
+                <a:solidFill>
+                  <a:srgbClr val="FFC000"/>
+                </a:solidFill>
+                <a:latin typeface="Trebuchet MS" panose="020B0603020202020204" pitchFamily="34" charset="0"/>
+              </a:rPr>
+              <a:t>+ 49% </a:t>
+            </a:r>
+          </a:p>
+          <a:p>
+            <a:r>
+              <a:rPr lang="es-ES" sz="2000" b="1" dirty="0">
+                <a:solidFill>
+                  <a:schemeClr val="bg2">
+                    <a:lumMod val="75000"/>
+                  </a:schemeClr>
+                </a:solidFill>
+                <a:latin typeface="Trebuchet MS" panose="020B0603020202020204" pitchFamily="34" charset="0"/>
+              </a:rPr>
+              <a:t> online tras pandemia</a:t>
+            </a:r>
+          </a:p>
+          <a:p>
+            <a:endParaRPr lang="es-ES" sz="2800" b="1" dirty="0">
+              <a:latin typeface="Trebuchet MS" panose="020B0603020202020204" pitchFamily="34" charset="0"/>
+            </a:endParaRPr>
+          </a:p>
+          <a:p>
+            <a:r>
+              <a:rPr lang="es-ES" sz="3600" b="1" dirty="0">
+                <a:solidFill>
+                  <a:srgbClr val="FFC000"/>
+                </a:solidFill>
+                <a:latin typeface="Trebuchet MS" panose="020B0603020202020204" pitchFamily="34" charset="0"/>
+              </a:rPr>
+              <a:t>+ 93% </a:t>
+            </a:r>
+          </a:p>
+          <a:p>
+            <a:r>
+              <a:rPr lang="es-ES" sz="1800" b="1" dirty="0">
+                <a:solidFill>
+                  <a:schemeClr val="bg2">
+                    <a:lumMod val="75000"/>
+                  </a:schemeClr>
+                </a:solidFill>
+                <a:latin typeface="Trebuchet MS" panose="020B0603020202020204" pitchFamily="34" charset="0"/>
+              </a:rPr>
+              <a:t> unificación herramientas</a:t>
+            </a:r>
+            <a:endParaRPr lang="es-ES" sz="1800" b="1" dirty="0">
               <a:solidFill>
-                <a:srgbClr val="222222"/>
+                <a:schemeClr val="bg2">
+                  <a:lumMod val="75000"/>
+                </a:schemeClr>
               </a:solidFill>
               <a:latin typeface="Roboto" panose="02000000000000000000" pitchFamily="2" charset="0"/>
             </a:endParaRPr>
-          </a:p>
-          <a:p>
-            <a:endParaRPr lang="es-ES" sz="2800" b="1" dirty="0">
-              <a:latin typeface="Trebuchet MS" panose="020B0603020202020204" pitchFamily="34" charset="0"/>
-            </a:endParaRPr>
-          </a:p>
-          <a:p>
-            <a:r>
-              <a:rPr lang="es-ES" sz="2800" b="1" dirty="0">
-                <a:latin typeface="Trebuchet MS" panose="020B0603020202020204" pitchFamily="34" charset="0"/>
-              </a:rPr>
-              <a:t>64% incluyen online por la pandemia</a:t>
-            </a:r>
-          </a:p>
-          <a:p>
-            <a:endParaRPr lang="es-ES" sz="2800" b="1" dirty="0">
-              <a:latin typeface="Trebuchet MS" panose="020B0603020202020204" pitchFamily="34" charset="0"/>
-            </a:endParaRPr>
-          </a:p>
-          <a:p>
-            <a:r>
-              <a:rPr lang="es-ES" sz="2800" b="1" dirty="0">
-                <a:latin typeface="Trebuchet MS" panose="020B0603020202020204" pitchFamily="34" charset="0"/>
-              </a:rPr>
-              <a:t>49% gimnasios incluyen online por pandemia</a:t>
-            </a:r>
           </a:p>
           <a:p>
             <a:endParaRPr lang="es-ES" sz="2800" b="1" dirty="0">
@@ -8311,12 +8394,6 @@
 </file>
 
 <file path=customXml/item1.xml><?xml version="1.0" encoding="utf-8"?>
-<p:properties xmlns:p="http://schemas.microsoft.com/office/2006/metadata/properties" xmlns:xsi="http://www.w3.org/2001/XMLSchema-instance" xmlns:pc="http://schemas.microsoft.com/office/infopath/2007/PartnerControls">
-  <documentManagement/>
-</p:properties>
-</file>
-
-<file path=customXml/item2.xml><?xml version="1.0" encoding="utf-8"?>
 <ct:contentTypeSchema xmlns:ct="http://schemas.microsoft.com/office/2006/metadata/contentType" xmlns:ma="http://schemas.microsoft.com/office/2006/metadata/properties/metaAttributes" ct:_="" ma:_="" ma:contentTypeName="Documento" ma:contentTypeID="0x0101006CC76C4A95B3B04A89FD25958FF911B1" ma:contentTypeVersion="4" ma:contentTypeDescription="Crear nuevo documento." ma:contentTypeScope="" ma:versionID="92561f9821f04e209362c7d0cd0d7c34">
   <xsd:schema xmlns:xsd="http://www.w3.org/2001/XMLSchema" xmlns:xs="http://www.w3.org/2001/XMLSchema" xmlns:p="http://schemas.microsoft.com/office/2006/metadata/properties" xmlns:ns2="4602cd45-3de6-4977-bad0-3d2d2e366396" xmlns:ns3="920f9b03-bbea-4400-bacc-6d64224da6d2" targetNamespace="http://schemas.microsoft.com/office/2006/metadata/properties" ma:root="true" ma:fieldsID="72090c88daa195022fe7c92515fad49a" ns2:_="" ns3:_="">
     <xsd:import namespace="4602cd45-3de6-4977-bad0-3d2d2e366396"/>
@@ -8481,6 +8558,12 @@
 </ct:contentTypeSchema>
 </file>
 
+<file path=customXml/item2.xml><?xml version="1.0" encoding="utf-8"?>
+<p:properties xmlns:p="http://schemas.microsoft.com/office/2006/metadata/properties" xmlns:xsi="http://www.w3.org/2001/XMLSchema-instance" xmlns:pc="http://schemas.microsoft.com/office/infopath/2007/PartnerControls">
+  <documentManagement/>
+</p:properties>
+</file>
+
 <file path=customXml/item3.xml><?xml version="1.0" encoding="utf-8"?>
 <?mso-contentType ?>
 <FormTemplates xmlns="http://schemas.microsoft.com/sharepoint/v3/contenttype/forms">
@@ -8491,24 +8574,6 @@
 </file>
 
 <file path=customXml/itemProps1.xml><?xml version="1.0" encoding="utf-8"?>
-<ds:datastoreItem xmlns:ds="http://schemas.openxmlformats.org/officeDocument/2006/customXml" ds:itemID="{065C06F2-6811-4915-8A08-5BDC663684E5}">
-  <ds:schemaRefs>
-    <ds:schemaRef ds:uri="http://schemas.microsoft.com/office/2006/documentManagement/types"/>
-    <ds:schemaRef ds:uri="bc7df76d-1ee4-4d78-a88e-68f95700b072"/>
-    <ds:schemaRef ds:uri="http://purl.org/dc/elements/1.1/"/>
-    <ds:schemaRef ds:uri="http://schemas.microsoft.com/office/2006/metadata/properties"/>
-    <ds:schemaRef ds:uri="http://schemas.microsoft.com/sharepoint/v3"/>
-    <ds:schemaRef ds:uri="http://purl.org/dc/terms/"/>
-    <ds:schemaRef ds:uri="http://schemas.openxmlformats.org/package/2006/metadata/core-properties"/>
-    <ds:schemaRef ds:uri="4c902c7f-9db5-41e6-a829-9da83e17d0aa"/>
-    <ds:schemaRef ds:uri="http://schemas.microsoft.com/office/infopath/2007/PartnerControls"/>
-    <ds:schemaRef ds:uri="http://www.w3.org/XML/1998/namespace"/>
-    <ds:schemaRef ds:uri="http://purl.org/dc/dcmitype/"/>
-  </ds:schemaRefs>
-</ds:datastoreItem>
-</file>
-
-<file path=customXml/itemProps2.xml><?xml version="1.0" encoding="utf-8"?>
 <ds:datastoreItem xmlns:ds="http://schemas.openxmlformats.org/officeDocument/2006/customXml" ds:itemID="{42492B8F-ED6F-42A2-9F38-8476379243D9}">
   <ds:schemaRefs>
     <ds:schemaRef ds:uri="http://schemas.microsoft.com/office/2006/metadata/contentType"/>
@@ -8527,6 +8592,24 @@
 </ds:datastoreItem>
 </file>
 
+<file path=customXml/itemProps2.xml><?xml version="1.0" encoding="utf-8"?>
+<ds:datastoreItem xmlns:ds="http://schemas.openxmlformats.org/officeDocument/2006/customXml" ds:itemID="{065C06F2-6811-4915-8A08-5BDC663684E5}">
+  <ds:schemaRefs>
+    <ds:schemaRef ds:uri="http://schemas.microsoft.com/office/2006/documentManagement/types"/>
+    <ds:schemaRef ds:uri="bc7df76d-1ee4-4d78-a88e-68f95700b072"/>
+    <ds:schemaRef ds:uri="http://purl.org/dc/elements/1.1/"/>
+    <ds:schemaRef ds:uri="http://schemas.microsoft.com/office/2006/metadata/properties"/>
+    <ds:schemaRef ds:uri="http://schemas.microsoft.com/sharepoint/v3"/>
+    <ds:schemaRef ds:uri="http://purl.org/dc/terms/"/>
+    <ds:schemaRef ds:uri="http://schemas.openxmlformats.org/package/2006/metadata/core-properties"/>
+    <ds:schemaRef ds:uri="4c902c7f-9db5-41e6-a829-9da83e17d0aa"/>
+    <ds:schemaRef ds:uri="http://schemas.microsoft.com/office/infopath/2007/PartnerControls"/>
+    <ds:schemaRef ds:uri="http://www.w3.org/XML/1998/namespace"/>
+    <ds:schemaRef ds:uri="http://purl.org/dc/dcmitype/"/>
+  </ds:schemaRefs>
+</ds:datastoreItem>
+</file>
+
 <file path=customXml/itemProps3.xml><?xml version="1.0" encoding="utf-8"?>
 <ds:datastoreItem xmlns:ds="http://schemas.openxmlformats.org/officeDocument/2006/customXml" ds:itemID="{1F695B4F-A284-40CE-A208-D76DF5652542}">
   <ds:schemaRefs>

</xml_diff>